<commit_message>
Added slides explaining Bytes vs String in Python for networking
</commit_message>
<xml_diff>
--- a/Networking.pptx
+++ b/Networking.pptx
@@ -5,7 +5,7 @@
     <p:sldMasterId id="2147483660" r:id="rId1"/>
   </p:sldMasterIdLst>
   <p:notesMasterIdLst>
-    <p:notesMasterId r:id="rId10"/>
+    <p:notesMasterId r:id="rId12"/>
   </p:notesMasterIdLst>
   <p:sldIdLst>
     <p:sldId id="256" r:id="rId2"/>
@@ -15,7 +15,9 @@
     <p:sldId id="259" r:id="rId6"/>
     <p:sldId id="260" r:id="rId7"/>
     <p:sldId id="261" r:id="rId8"/>
-    <p:sldId id="263" r:id="rId9"/>
+    <p:sldId id="264" r:id="rId9"/>
+    <p:sldId id="265" r:id="rId10"/>
+    <p:sldId id="263" r:id="rId11"/>
   </p:sldIdLst>
   <p:sldSz cx="12192000" cy="6858000"/>
   <p:notesSz cx="6858000" cy="9144000"/>
@@ -114,6 +116,11 @@
       </a:defRPr>
     </a:lvl9pPr>
   </p:defaultTextStyle>
+  <p:extLst>
+    <p:ext uri="{EFAFB233-063F-42B5-8137-9DF3F51BA10A}">
+      <p15:sldGuideLst xmlns:p15="http://schemas.microsoft.com/office/powerpoint/2012/main"/>
+    </p:ext>
+  </p:extLst>
 </p:presentation>
 </file>
 
@@ -199,7 +206,7 @@
           <a:p>
             <a:fld id="{58DEA068-1C68-47E1-A101-148EE9DAE26E}" type="datetimeFigureOut">
               <a:rPr lang="en-US" smtClean="0"/>
-              <a:t>9/26/2021</a:t>
+              <a:t>9/27/2021</a:t>
             </a:fld>
             <a:endParaRPr lang="en-US"/>
           </a:p>
@@ -684,7 +691,7 @@
           <a:p>
             <a:fld id="{635903D2-23B4-4C91-A19D-6E94ADF765C3}" type="datetimeFigureOut">
               <a:rPr lang="en-US" smtClean="0"/>
-              <a:t>9/26/2021</a:t>
+              <a:t>9/27/2021</a:t>
             </a:fld>
             <a:endParaRPr lang="en-US"/>
           </a:p>
@@ -854,7 +861,7 @@
           <a:p>
             <a:fld id="{635903D2-23B4-4C91-A19D-6E94ADF765C3}" type="datetimeFigureOut">
               <a:rPr lang="en-US" smtClean="0"/>
-              <a:t>9/26/2021</a:t>
+              <a:t>9/27/2021</a:t>
             </a:fld>
             <a:endParaRPr lang="en-US"/>
           </a:p>
@@ -1034,7 +1041,7 @@
           <a:p>
             <a:fld id="{635903D2-23B4-4C91-A19D-6E94ADF765C3}" type="datetimeFigureOut">
               <a:rPr lang="en-US" smtClean="0"/>
-              <a:t>9/26/2021</a:t>
+              <a:t>9/27/2021</a:t>
             </a:fld>
             <a:endParaRPr lang="en-US"/>
           </a:p>
@@ -1204,7 +1211,7 @@
           <a:p>
             <a:fld id="{635903D2-23B4-4C91-A19D-6E94ADF765C3}" type="datetimeFigureOut">
               <a:rPr lang="en-US" smtClean="0"/>
-              <a:t>9/26/2021</a:t>
+              <a:t>9/27/2021</a:t>
             </a:fld>
             <a:endParaRPr lang="en-US"/>
           </a:p>
@@ -1450,7 +1457,7 @@
           <a:p>
             <a:fld id="{635903D2-23B4-4C91-A19D-6E94ADF765C3}" type="datetimeFigureOut">
               <a:rPr lang="en-US" smtClean="0"/>
-              <a:t>9/26/2021</a:t>
+              <a:t>9/27/2021</a:t>
             </a:fld>
             <a:endParaRPr lang="en-US"/>
           </a:p>
@@ -1682,7 +1689,7 @@
           <a:p>
             <a:fld id="{635903D2-23B4-4C91-A19D-6E94ADF765C3}" type="datetimeFigureOut">
               <a:rPr lang="en-US" smtClean="0"/>
-              <a:t>9/26/2021</a:t>
+              <a:t>9/27/2021</a:t>
             </a:fld>
             <a:endParaRPr lang="en-US"/>
           </a:p>
@@ -2049,7 +2056,7 @@
           <a:p>
             <a:fld id="{635903D2-23B4-4C91-A19D-6E94ADF765C3}" type="datetimeFigureOut">
               <a:rPr lang="en-US" smtClean="0"/>
-              <a:t>9/26/2021</a:t>
+              <a:t>9/27/2021</a:t>
             </a:fld>
             <a:endParaRPr lang="en-US"/>
           </a:p>
@@ -2167,7 +2174,7 @@
           <a:p>
             <a:fld id="{635903D2-23B4-4C91-A19D-6E94ADF765C3}" type="datetimeFigureOut">
               <a:rPr lang="en-US" smtClean="0"/>
-              <a:t>9/26/2021</a:t>
+              <a:t>9/27/2021</a:t>
             </a:fld>
             <a:endParaRPr lang="en-US"/>
           </a:p>
@@ -2262,7 +2269,7 @@
           <a:p>
             <a:fld id="{635903D2-23B4-4C91-A19D-6E94ADF765C3}" type="datetimeFigureOut">
               <a:rPr lang="en-US" smtClean="0"/>
-              <a:t>9/26/2021</a:t>
+              <a:t>9/27/2021</a:t>
             </a:fld>
             <a:endParaRPr lang="en-US"/>
           </a:p>
@@ -2539,7 +2546,7 @@
           <a:p>
             <a:fld id="{635903D2-23B4-4C91-A19D-6E94ADF765C3}" type="datetimeFigureOut">
               <a:rPr lang="en-US" smtClean="0"/>
-              <a:t>9/26/2021</a:t>
+              <a:t>9/27/2021</a:t>
             </a:fld>
             <a:endParaRPr lang="en-US"/>
           </a:p>
@@ -2796,7 +2803,7 @@
           <a:p>
             <a:fld id="{635903D2-23B4-4C91-A19D-6E94ADF765C3}" type="datetimeFigureOut">
               <a:rPr lang="en-US" smtClean="0"/>
-              <a:t>9/26/2021</a:t>
+              <a:t>9/27/2021</a:t>
             </a:fld>
             <a:endParaRPr lang="en-US"/>
           </a:p>
@@ -3009,7 +3016,7 @@
           <a:p>
             <a:fld id="{635903D2-23B4-4C91-A19D-6E94ADF765C3}" type="datetimeFigureOut">
               <a:rPr lang="en-US" smtClean="0"/>
-              <a:t>9/26/2021</a:t>
+              <a:t>9/27/2021</a:t>
             </a:fld>
             <a:endParaRPr lang="en-US"/>
           </a:p>
@@ -3480,6 +3487,221 @@
 </p:sld>
 </file>
 
+<file path=ppt/slides/slide10.xml><?xml version="1.0" encoding="utf-8"?>
+<p:sld xmlns:a="http://schemas.openxmlformats.org/drawingml/2006/main" xmlns:r="http://schemas.openxmlformats.org/officeDocument/2006/relationships" xmlns:p="http://schemas.openxmlformats.org/presentationml/2006/main">
+  <p:cSld>
+    <p:spTree>
+      <p:nvGrpSpPr>
+        <p:cNvPr id="1" name=""/>
+        <p:cNvGrpSpPr/>
+        <p:nvPr/>
+      </p:nvGrpSpPr>
+      <p:grpSpPr>
+        <a:xfrm>
+          <a:off x="0" y="0"/>
+          <a:ext cx="0" cy="0"/>
+          <a:chOff x="0" y="0"/>
+          <a:chExt cx="0" cy="0"/>
+        </a:xfrm>
+      </p:grpSpPr>
+      <p:sp>
+        <p:nvSpPr>
+          <p:cNvPr id="2" name="Title 1">
+            <a:extLst>
+              <a:ext uri="{FF2B5EF4-FFF2-40B4-BE49-F238E27FC236}">
+                <a16:creationId xmlns:a16="http://schemas.microsoft.com/office/drawing/2014/main" id="{966A9E37-2F8F-4A52-BC03-03B3D314ACC1}"/>
+              </a:ext>
+            </a:extLst>
+          </p:cNvPr>
+          <p:cNvSpPr>
+            <a:spLocks noGrp="1"/>
+          </p:cNvSpPr>
+          <p:nvPr>
+            <p:ph type="title"/>
+          </p:nvPr>
+        </p:nvSpPr>
+        <p:spPr/>
+        <p:txBody>
+          <a:bodyPr/>
+          <a:lstStyle/>
+          <a:p>
+            <a:r>
+              <a:rPr lang="en-US" dirty="0"/>
+              <a:t>Troubleshooting (You’ll need it)</a:t>
+            </a:r>
+          </a:p>
+        </p:txBody>
+      </p:sp>
+      <p:sp>
+        <p:nvSpPr>
+          <p:cNvPr id="3" name="Content Placeholder 2">
+            <a:extLst>
+              <a:ext uri="{FF2B5EF4-FFF2-40B4-BE49-F238E27FC236}">
+                <a16:creationId xmlns:a16="http://schemas.microsoft.com/office/drawing/2014/main" id="{A45A25B9-C419-4595-96DE-6C7B4EA65076}"/>
+              </a:ext>
+            </a:extLst>
+          </p:cNvPr>
+          <p:cNvSpPr>
+            <a:spLocks noGrp="1"/>
+          </p:cNvSpPr>
+          <p:nvPr>
+            <p:ph idx="1"/>
+          </p:nvPr>
+        </p:nvSpPr>
+        <p:spPr/>
+        <p:txBody>
+          <a:bodyPr>
+            <a:normAutofit fontScale="92500" lnSpcReduction="10000"/>
+          </a:bodyPr>
+          <a:lstStyle/>
+          <a:p>
+            <a:r>
+              <a:rPr lang="en-US" dirty="0"/>
+              <a:t>You will likely run into ‘zombie’ sockets that hog a port after you want them shutdown, preventing use of that port.</a:t>
+            </a:r>
+          </a:p>
+          <a:p>
+            <a:r>
+              <a:rPr lang="en-US" dirty="0"/>
+              <a:t>Use `</a:t>
+            </a:r>
+            <a:r>
+              <a:rPr lang="en-US" dirty="0">
+                <a:latin typeface="Consolas" panose="020B0609020204030204" pitchFamily="49" charset="0"/>
+              </a:rPr>
+              <a:t>netstat -</a:t>
+            </a:r>
+            <a:r>
+              <a:rPr lang="en-US" dirty="0" err="1">
+                <a:latin typeface="Consolas" panose="020B0609020204030204" pitchFamily="49" charset="0"/>
+              </a:rPr>
+              <a:t>ano</a:t>
+            </a:r>
+            <a:r>
+              <a:rPr lang="en-US" dirty="0"/>
+              <a:t>` to check current sockets on your computer.</a:t>
+            </a:r>
+          </a:p>
+          <a:p>
+            <a:r>
+              <a:rPr lang="en-US" dirty="0"/>
+              <a:t>On </a:t>
+            </a:r>
+            <a:r>
+              <a:rPr lang="en-US" dirty="0" err="1"/>
+              <a:t>linux</a:t>
+            </a:r>
+            <a:r>
+              <a:rPr lang="en-US" dirty="0"/>
+              <a:t> systems use `</a:t>
+            </a:r>
+            <a:r>
+              <a:rPr lang="en-US" dirty="0" err="1"/>
+              <a:t>lsof</a:t>
+            </a:r>
+            <a:r>
+              <a:rPr lang="en-US" dirty="0"/>
+              <a:t> -</a:t>
+            </a:r>
+            <a:r>
+              <a:rPr lang="en-US" dirty="0" err="1"/>
+              <a:t>i</a:t>
+            </a:r>
+            <a:r>
+              <a:rPr lang="en-US" dirty="0"/>
+              <a:t> –n` to identify sockets and their associated process IDs.</a:t>
+            </a:r>
+          </a:p>
+          <a:p>
+            <a:r>
+              <a:rPr lang="en-US" dirty="0"/>
+              <a:t>Both have a lot of output, so pipe to `</a:t>
+            </a:r>
+            <a:r>
+              <a:rPr lang="en-US" dirty="0">
+                <a:latin typeface="Consolas" panose="020B0609020204030204" pitchFamily="49" charset="0"/>
+              </a:rPr>
+              <a:t>grep</a:t>
+            </a:r>
+            <a:r>
+              <a:rPr lang="en-US" dirty="0"/>
+              <a:t>` or `</a:t>
+            </a:r>
+            <a:r>
+              <a:rPr lang="en-US" dirty="0" err="1">
+                <a:latin typeface="Consolas" panose="020B0609020204030204" pitchFamily="49" charset="0"/>
+              </a:rPr>
+              <a:t>findstr</a:t>
+            </a:r>
+            <a:r>
+              <a:rPr lang="en-US" dirty="0"/>
+              <a:t>` for your port on </a:t>
+            </a:r>
+            <a:r>
+              <a:rPr lang="en-US" dirty="0" err="1"/>
+              <a:t>linux</a:t>
+            </a:r>
+            <a:r>
+              <a:rPr lang="en-US" dirty="0"/>
+              <a:t> and windows, respectively.</a:t>
+            </a:r>
+          </a:p>
+          <a:p>
+            <a:r>
+              <a:rPr lang="en-US" dirty="0"/>
+              <a:t>Use `</a:t>
+            </a:r>
+            <a:r>
+              <a:rPr lang="en-US" dirty="0">
+                <a:latin typeface="Consolas" panose="020B0609020204030204" pitchFamily="49" charset="0"/>
+              </a:rPr>
+              <a:t>kill</a:t>
+            </a:r>
+            <a:r>
+              <a:rPr lang="en-US" dirty="0"/>
+              <a:t>` on both systems to kill the process associated with the socket. Some trial and error may be required.</a:t>
+            </a:r>
+          </a:p>
+          <a:p>
+            <a:r>
+              <a:rPr lang="en-US" dirty="0"/>
+              <a:t>On windows you can also use task manager to kill processes.</a:t>
+            </a:r>
+          </a:p>
+          <a:p>
+            <a:pPr lvl="1"/>
+            <a:r>
+              <a:rPr lang="en-US" dirty="0"/>
+              <a:t> </a:t>
+            </a:r>
+            <a:r>
+              <a:rPr lang="en-US" dirty="0" err="1"/>
+              <a:t>ctl+shift+escape</a:t>
+            </a:r>
+            <a:r>
+              <a:rPr lang="en-US" dirty="0"/>
+              <a:t> is an easy way to bring up the task manager</a:t>
+            </a:r>
+          </a:p>
+          <a:p>
+            <a:pPr lvl="1"/>
+            <a:endParaRPr lang="en-US" dirty="0"/>
+          </a:p>
+        </p:txBody>
+      </p:sp>
+    </p:spTree>
+    <p:extLst>
+      <p:ext uri="{BB962C8B-B14F-4D97-AF65-F5344CB8AC3E}">
+        <p14:creationId xmlns:p14="http://schemas.microsoft.com/office/powerpoint/2010/main" val="3307161559"/>
+      </p:ext>
+    </p:extLst>
+  </p:cSld>
+  <p:clrMapOvr>
+    <a:masterClrMapping/>
+  </p:clrMapOvr>
+</p:sld>
+</file>
+
 <file path=ppt/slides/slide2.xml><?xml version="1.0" encoding="utf-8"?>
 <p:sld xmlns:a="http://schemas.openxmlformats.org/drawingml/2006/main" xmlns:r="http://schemas.openxmlformats.org/officeDocument/2006/relationships" xmlns:p="http://schemas.openxmlformats.org/presentationml/2006/main">
   <p:cSld>
@@ -4296,7 +4518,7 @@
           <p:cNvPr id="2" name="Title 1">
             <a:extLst>
               <a:ext uri="{FF2B5EF4-FFF2-40B4-BE49-F238E27FC236}">
-                <a16:creationId xmlns:a16="http://schemas.microsoft.com/office/drawing/2014/main" id="{966A9E37-2F8F-4A52-BC03-03B3D314ACC1}"/>
+                <a16:creationId xmlns:a16="http://schemas.microsoft.com/office/drawing/2014/main" id="{B5ABB854-EB4E-45C5-8125-C0B7CB0E4AE3}"/>
               </a:ext>
             </a:extLst>
           </p:cNvPr>
@@ -4314,7 +4536,7 @@
           <a:p>
             <a:r>
               <a:rPr lang="en-US" dirty="0"/>
-              <a:t>Troubleshooting (You’ll need it)</a:t>
+              <a:t>Bytes  vs Strings</a:t>
             </a:r>
           </a:p>
         </p:txBody>
@@ -4324,7 +4546,7 @@
           <p:cNvPr id="3" name="Content Placeholder 2">
             <a:extLst>
               <a:ext uri="{FF2B5EF4-FFF2-40B4-BE49-F238E27FC236}">
-                <a16:creationId xmlns:a16="http://schemas.microsoft.com/office/drawing/2014/main" id="{A45A25B9-C419-4595-96DE-6C7B4EA65076}"/>
+                <a16:creationId xmlns:a16="http://schemas.microsoft.com/office/drawing/2014/main" id="{068389AA-EC86-4698-9774-8C215B4376B8}"/>
               </a:ext>
             </a:extLst>
           </p:cNvPr>
@@ -4337,149 +4559,244 @@
         </p:nvSpPr>
         <p:spPr/>
         <p:txBody>
-          <a:bodyPr>
-            <a:normAutofit fontScale="92500" lnSpcReduction="10000"/>
-          </a:bodyPr>
+          <a:bodyPr/>
           <a:lstStyle/>
           <a:p>
             <a:r>
               <a:rPr lang="en-US" dirty="0"/>
-              <a:t>You will likely run into ‘zombie’ sockets that hog a port after you want them shutdown, preventing use of that port.</a:t>
+              <a:t>Python’s String and Bytes data structures are similar but have a few critical differences</a:t>
             </a:r>
           </a:p>
           <a:p>
             <a:r>
               <a:rPr lang="en-US" dirty="0"/>
-              <a:t>Use `</a:t>
+              <a:t>For Strings each entry is a single character, so each entry could be multiple bytes depending on what type of character it is (e.g. emoji’s take multiple bytes but are a single character)</a:t>
+            </a:r>
+          </a:p>
+          <a:p>
+            <a:r>
+              <a:rPr lang="en-US" dirty="0"/>
+              <a:t>For Bytes each entry is a single byte, so for a multi byte character such as an emoji it would have multiple sequential entries.</a:t>
+            </a:r>
+          </a:p>
+        </p:txBody>
+      </p:sp>
+    </p:spTree>
+    <p:extLst>
+      <p:ext uri="{BB962C8B-B14F-4D97-AF65-F5344CB8AC3E}">
+        <p14:creationId xmlns:p14="http://schemas.microsoft.com/office/powerpoint/2010/main" val="3737007536"/>
+      </p:ext>
+    </p:extLst>
+  </p:cSld>
+  <p:clrMapOvr>
+    <a:masterClrMapping/>
+  </p:clrMapOvr>
+</p:sld>
+</file>
+
+<file path=ppt/slides/slide9.xml><?xml version="1.0" encoding="utf-8"?>
+<p:sld xmlns:a="http://schemas.openxmlformats.org/drawingml/2006/main" xmlns:r="http://schemas.openxmlformats.org/officeDocument/2006/relationships" xmlns:p="http://schemas.openxmlformats.org/presentationml/2006/main">
+  <p:cSld>
+    <p:spTree>
+      <p:nvGrpSpPr>
+        <p:cNvPr id="1" name=""/>
+        <p:cNvGrpSpPr/>
+        <p:nvPr/>
+      </p:nvGrpSpPr>
+      <p:grpSpPr>
+        <a:xfrm>
+          <a:off x="0" y="0"/>
+          <a:ext cx="0" cy="0"/>
+          <a:chOff x="0" y="0"/>
+          <a:chExt cx="0" cy="0"/>
+        </a:xfrm>
+      </p:grpSpPr>
+      <p:sp>
+        <p:nvSpPr>
+          <p:cNvPr id="2" name="Title 1">
+            <a:extLst>
+              <a:ext uri="{FF2B5EF4-FFF2-40B4-BE49-F238E27FC236}">
+                <a16:creationId xmlns:a16="http://schemas.microsoft.com/office/drawing/2014/main" id="{1471D726-18E2-434A-876E-2FC80A50D524}"/>
+              </a:ext>
+            </a:extLst>
+          </p:cNvPr>
+          <p:cNvSpPr>
+            <a:spLocks noGrp="1"/>
+          </p:cNvSpPr>
+          <p:nvPr>
+            <p:ph type="title"/>
+          </p:nvPr>
+        </p:nvSpPr>
+        <p:spPr/>
+        <p:txBody>
+          <a:bodyPr/>
+          <a:lstStyle/>
+          <a:p>
+            <a:r>
+              <a:rPr lang="en-US" dirty="0"/>
+              <a:t>Bytes vs Strings (cont.)</a:t>
+            </a:r>
+          </a:p>
+        </p:txBody>
+      </p:sp>
+      <p:sp>
+        <p:nvSpPr>
+          <p:cNvPr id="3" name="Content Placeholder 2">
+            <a:extLst>
+              <a:ext uri="{FF2B5EF4-FFF2-40B4-BE49-F238E27FC236}">
+                <a16:creationId xmlns:a16="http://schemas.microsoft.com/office/drawing/2014/main" id="{D3AF6FD9-3EFB-4A1C-92A9-38E7D6FE4827}"/>
+              </a:ext>
+            </a:extLst>
+          </p:cNvPr>
+          <p:cNvSpPr>
+            <a:spLocks noGrp="1"/>
+          </p:cNvSpPr>
+          <p:nvPr>
+            <p:ph idx="1"/>
+          </p:nvPr>
+        </p:nvSpPr>
+        <p:spPr/>
+        <p:txBody>
+          <a:bodyPr/>
+          <a:lstStyle/>
+          <a:p>
+            <a:r>
+              <a:rPr lang="en-US" dirty="0"/>
+              <a:t>Sockets expect </a:t>
             </a:r>
             <a:r>
               <a:rPr lang="en-US" dirty="0">
                 <a:latin typeface="Consolas" panose="020B0609020204030204" pitchFamily="49" charset="0"/>
               </a:rPr>
-              <a:t>netstat -</a:t>
+              <a:t>Bytes</a:t>
+            </a:r>
+            <a:r>
+              <a:rPr lang="en-US" dirty="0"/>
+              <a:t> objects as inputs to </a:t>
+            </a:r>
+            <a:r>
+              <a:rPr lang="en-US" dirty="0">
+                <a:latin typeface="Consolas" panose="020B0609020204030204" pitchFamily="49" charset="0"/>
+              </a:rPr>
+              <a:t>send</a:t>
+            </a:r>
+            <a:r>
+              <a:rPr lang="en-US" dirty="0"/>
+              <a:t> and returns </a:t>
+            </a:r>
+            <a:r>
+              <a:rPr lang="en-US" dirty="0">
+                <a:latin typeface="Consolas" panose="020B0609020204030204" pitchFamily="49" charset="0"/>
+              </a:rPr>
+              <a:t>Bytes</a:t>
+            </a:r>
+            <a:r>
+              <a:rPr lang="en-US" dirty="0"/>
+              <a:t> objects from </a:t>
             </a:r>
             <a:r>
               <a:rPr lang="en-US" dirty="0" err="1">
                 <a:latin typeface="Consolas" panose="020B0609020204030204" pitchFamily="49" charset="0"/>
               </a:rPr>
-              <a:t>ano</a:t>
+              <a:t>recv</a:t>
             </a:r>
             <a:r>
               <a:rPr lang="en-US" dirty="0"/>
-              <a:t>` to check current sockets on your computer.</a:t>
+              <a:t>.</a:t>
             </a:r>
           </a:p>
           <a:p>
             <a:r>
               <a:rPr lang="en-US" dirty="0"/>
-              <a:t>On </a:t>
-            </a:r>
-            <a:r>
-              <a:rPr lang="en-US" dirty="0" err="1"/>
-              <a:t>linux</a:t>
-            </a:r>
-            <a:r>
-              <a:rPr lang="en-US" dirty="0"/>
-              <a:t> systems use `</a:t>
-            </a:r>
-            <a:r>
-              <a:rPr lang="en-US" dirty="0" err="1"/>
-              <a:t>lsof</a:t>
-            </a:r>
-            <a:r>
-              <a:rPr lang="en-US" dirty="0"/>
-              <a:t> -</a:t>
-            </a:r>
-            <a:r>
-              <a:rPr lang="en-US" dirty="0" err="1"/>
-              <a:t>i</a:t>
-            </a:r>
-            <a:r>
-              <a:rPr lang="en-US" dirty="0"/>
-              <a:t> –n` to identify sockets and their associated process IDs.</a:t>
-            </a:r>
-          </a:p>
-          <a:p>
-            <a:r>
-              <a:rPr lang="en-US" dirty="0"/>
-              <a:t>Both have a lot of output, so pipe to `</a:t>
+              <a:t>You can convert back and forth using </a:t>
             </a:r>
             <a:r>
               <a:rPr lang="en-US" dirty="0">
                 <a:latin typeface="Consolas" panose="020B0609020204030204" pitchFamily="49" charset="0"/>
               </a:rPr>
-              <a:t>grep</a:t>
+              <a:t>encode</a:t>
             </a:r>
             <a:r>
               <a:rPr lang="en-US" dirty="0"/>
-              <a:t>` or `</a:t>
-            </a:r>
-            <a:r>
-              <a:rPr lang="en-US" dirty="0" err="1">
-                <a:latin typeface="Consolas" panose="020B0609020204030204" pitchFamily="49" charset="0"/>
-              </a:rPr>
-              <a:t>findstr</a:t>
-            </a:r>
-            <a:r>
-              <a:rPr lang="en-US" dirty="0"/>
-              <a:t>` for your port on </a:t>
-            </a:r>
-            <a:r>
-              <a:rPr lang="en-US" dirty="0" err="1"/>
-              <a:t>linux</a:t>
-            </a:r>
-            <a:r>
-              <a:rPr lang="en-US" dirty="0"/>
-              <a:t> and windows, respectively.</a:t>
-            </a:r>
-          </a:p>
-          <a:p>
-            <a:r>
-              <a:rPr lang="en-US" dirty="0"/>
-              <a:t>Use `</a:t>
+              <a:t> and </a:t>
             </a:r>
             <a:r>
               <a:rPr lang="en-US" dirty="0">
                 <a:latin typeface="Consolas" panose="020B0609020204030204" pitchFamily="49" charset="0"/>
               </a:rPr>
-              <a:t>kill</a:t>
+              <a:t>decode</a:t>
             </a:r>
             <a:r>
               <a:rPr lang="en-US" dirty="0"/>
-              <a:t>` on both systems to kill the process associated with the socket. Some trial and error may be required.</a:t>
-            </a:r>
-          </a:p>
-          <a:p>
-            <a:r>
-              <a:rPr lang="en-US" dirty="0"/>
-              <a:t>On windows you can also use task manager to kill processes.</a:t>
-            </a:r>
-          </a:p>
-          <a:p>
-            <a:pPr lvl="1"/>
-            <a:r>
-              <a:rPr lang="en-US" dirty="0"/>
-              <a:t> </a:t>
-            </a:r>
-            <a:r>
-              <a:rPr lang="en-US" dirty="0" err="1"/>
-              <a:t>ctl+shift+escape</a:t>
-            </a:r>
-            <a:r>
-              <a:rPr lang="en-US" dirty="0"/>
-              <a:t> is an easy way to bring up the task manager</a:t>
-            </a:r>
-          </a:p>
-          <a:p>
-            <a:pPr lvl="1"/>
-            <a:endParaRPr lang="en-US" dirty="0"/>
-          </a:p>
-        </p:txBody>
-      </p:sp>
+              <a:t> methods</a:t>
+            </a:r>
+          </a:p>
+        </p:txBody>
+      </p:sp>
+      <p:pic>
+        <p:nvPicPr>
+          <p:cNvPr id="5" name="Picture 4">
+            <a:extLst>
+              <a:ext uri="{FF2B5EF4-FFF2-40B4-BE49-F238E27FC236}">
+                <a16:creationId xmlns:a16="http://schemas.microsoft.com/office/drawing/2014/main" id="{7701287C-D88D-4AA8-ABE7-FF0889BC1B23}"/>
+              </a:ext>
+            </a:extLst>
+          </p:cNvPr>
+          <p:cNvPicPr>
+            <a:picLocks noChangeAspect="1"/>
+          </p:cNvPicPr>
+          <p:nvPr/>
+        </p:nvPicPr>
+        <p:blipFill>
+          <a:blip r:embed="rId2"/>
+          <a:stretch>
+            <a:fillRect/>
+          </a:stretch>
+        </p:blipFill>
+        <p:spPr>
+          <a:xfrm>
+            <a:off x="1014363" y="3428999"/>
+            <a:ext cx="10861941" cy="1847269"/>
+          </a:xfrm>
+          <a:prstGeom prst="rect">
+            <a:avLst/>
+          </a:prstGeom>
+        </p:spPr>
+      </p:pic>
+      <p:pic>
+        <p:nvPicPr>
+          <p:cNvPr id="7" name="Picture 6">
+            <a:extLst>
+              <a:ext uri="{FF2B5EF4-FFF2-40B4-BE49-F238E27FC236}">
+                <a16:creationId xmlns:a16="http://schemas.microsoft.com/office/drawing/2014/main" id="{9B2572F6-F028-4A80-9A53-1D29AA96CD1D}"/>
+              </a:ext>
+            </a:extLst>
+          </p:cNvPr>
+          <p:cNvPicPr>
+            <a:picLocks noChangeAspect="1"/>
+          </p:cNvPicPr>
+          <p:nvPr/>
+        </p:nvPicPr>
+        <p:blipFill>
+          <a:blip r:embed="rId3"/>
+          <a:stretch>
+            <a:fillRect/>
+          </a:stretch>
+        </p:blipFill>
+        <p:spPr>
+          <a:xfrm>
+            <a:off x="1014363" y="5411206"/>
+            <a:ext cx="7923865" cy="1187556"/>
+          </a:xfrm>
+          <a:prstGeom prst="rect">
+            <a:avLst/>
+          </a:prstGeom>
+        </p:spPr>
+      </p:pic>
     </p:spTree>
     <p:extLst>
       <p:ext uri="{BB962C8B-B14F-4D97-AF65-F5344CB8AC3E}">
-        <p14:creationId xmlns:p14="http://schemas.microsoft.com/office/powerpoint/2010/main" val="3307161559"/>
+        <p14:creationId xmlns:p14="http://schemas.microsoft.com/office/powerpoint/2010/main" val="2672675034"/>
       </p:ext>
     </p:extLst>
   </p:cSld>

</xml_diff>